<commit_message>
Update At-Sea Observer review 2023.pptx
</commit_message>
<xml_diff>
--- a/doc/At-Sea Observer review 2023.pptx
+++ b/doc/At-Sea Observer review 2023.pptx
@@ -6895,13 +6895,13 @@
         </p:nvSpPr>
         <p:spPr>
           <a:xfrm>
-            <a:off x="491805" y="614190"/>
-            <a:ext cx="10799778" cy="3664795"/>
+            <a:off x="567306" y="572245"/>
+            <a:ext cx="10984334" cy="4578595"/>
           </a:xfrm>
         </p:spPr>
         <p:txBody>
           <a:bodyPr>
-            <a:normAutofit fontScale="92500" lnSpcReduction="10000"/>
+            <a:normAutofit fontScale="92500" lnSpcReduction="20000"/>
           </a:bodyPr>
           <a:lstStyle/>
           <a:p>
@@ -6928,6 +6928,14 @@
             </a:r>
           </a:p>
           <a:p>
+            <a:pPr marL="0" indent="0">
+              <a:buNone/>
+            </a:pPr>
+            <a:endParaRPr lang="fr-CA" sz="3500" b="1" dirty="0">
+              <a:latin typeface="+mn-lt"/>
+            </a:endParaRPr>
+          </a:p>
+          <a:p>
             <a:r>
               <a:rPr lang="fr-CA" dirty="0"/>
               <a:t>Update and </a:t>
@@ -7025,6 +7033,20 @@
             <a:r>
               <a:rPr lang="en-US" dirty="0"/>
               <a:t>Inspect and calibrate caliper and durometer.</a:t>
+            </a:r>
+          </a:p>
+          <a:p>
+            <a:pPr lvl="1"/>
+            <a:r>
+              <a:rPr lang="en-US" dirty="0"/>
+              <a:t>Check for easier-to-read calipers (1 mm precision is sufficient).</a:t>
+            </a:r>
+          </a:p>
+          <a:p>
+            <a:pPr lvl="1"/>
+            <a:r>
+              <a:rPr lang="en-US" dirty="0"/>
+              <a:t>Check for modern version of durometer.</a:t>
             </a:r>
           </a:p>
           <a:p>

</xml_diff>